<commit_message>
fixes and improves AppVeyor integration
</commit_message>
<xml_diff>
--- a/images.pptx
+++ b/images.pptx
@@ -8,6 +8,7 @@
     <p:sldId id="256" r:id="rId2"/>
     <p:sldId id="257" r:id="rId3"/>
     <p:sldId id="259" r:id="rId4"/>
+    <p:sldId id="260" r:id="rId5"/>
   </p:sldIdLst>
   <p:sldSz cx="12192000" cy="6858000"/>
   <p:notesSz cx="6858000" cy="9144000"/>
@@ -156,7 +157,7 @@
           </a:lstStyle>
           <a:p>
             <a:r>
-              <a:rPr lang="en-US" smtClean="0"/>
+              <a:rPr lang="en-US"/>
               <a:t>Click to edit Master title style</a:t>
             </a:r>
             <a:endParaRPr lang="de-AT"/>
@@ -221,7 +222,7 @@
           </a:lstStyle>
           <a:p>
             <a:r>
-              <a:rPr lang="en-US" smtClean="0"/>
+              <a:rPr lang="en-US"/>
               <a:t>Click to edit Master subtitle style</a:t>
             </a:r>
             <a:endParaRPr lang="de-AT"/>
@@ -245,7 +246,7 @@
           <a:p>
             <a:fld id="{E5B2F287-A29C-4C70-831C-74BFCFEDEFEA}" type="datetimeFigureOut">
               <a:rPr lang="de-AT" smtClean="0"/>
-              <a:t>27.12.2018</a:t>
+              <a:t>11.04.19</a:t>
             </a:fld>
             <a:endParaRPr lang="de-AT"/>
           </a:p>
@@ -339,7 +340,7 @@
           <a:lstStyle/>
           <a:p>
             <a:r>
-              <a:rPr lang="en-US" smtClean="0"/>
+              <a:rPr lang="en-US"/>
               <a:t>Click to edit Master title style</a:t>
             </a:r>
             <a:endParaRPr lang="de-AT"/>
@@ -363,35 +364,35 @@
           <a:p>
             <a:pPr lvl="0"/>
             <a:r>
-              <a:rPr lang="en-US" smtClean="0"/>
+              <a:rPr lang="en-US"/>
               <a:t>Edit Master text styles</a:t>
             </a:r>
           </a:p>
           <a:p>
             <a:pPr lvl="1"/>
             <a:r>
-              <a:rPr lang="en-US" smtClean="0"/>
+              <a:rPr lang="en-US"/>
               <a:t>Second level</a:t>
             </a:r>
           </a:p>
           <a:p>
             <a:pPr lvl="2"/>
             <a:r>
-              <a:rPr lang="en-US" smtClean="0"/>
+              <a:rPr lang="en-US"/>
               <a:t>Third level</a:t>
             </a:r>
           </a:p>
           <a:p>
             <a:pPr lvl="3"/>
             <a:r>
-              <a:rPr lang="en-US" smtClean="0"/>
+              <a:rPr lang="en-US"/>
               <a:t>Fourth level</a:t>
             </a:r>
           </a:p>
           <a:p>
             <a:pPr lvl="4"/>
             <a:r>
-              <a:rPr lang="en-US" smtClean="0"/>
+              <a:rPr lang="en-US"/>
               <a:t>Fifth level</a:t>
             </a:r>
             <a:endParaRPr lang="de-AT"/>
@@ -415,7 +416,7 @@
           <a:p>
             <a:fld id="{E5B2F287-A29C-4C70-831C-74BFCFEDEFEA}" type="datetimeFigureOut">
               <a:rPr lang="de-AT" smtClean="0"/>
-              <a:t>27.12.2018</a:t>
+              <a:t>11.04.19</a:t>
             </a:fld>
             <a:endParaRPr lang="de-AT"/>
           </a:p>
@@ -514,7 +515,7 @@
           <a:lstStyle/>
           <a:p>
             <a:r>
-              <a:rPr lang="en-US" smtClean="0"/>
+              <a:rPr lang="en-US"/>
               <a:t>Click to edit Master title style</a:t>
             </a:r>
             <a:endParaRPr lang="de-AT"/>
@@ -543,35 +544,35 @@
           <a:p>
             <a:pPr lvl="0"/>
             <a:r>
-              <a:rPr lang="en-US" smtClean="0"/>
+              <a:rPr lang="en-US"/>
               <a:t>Edit Master text styles</a:t>
             </a:r>
           </a:p>
           <a:p>
             <a:pPr lvl="1"/>
             <a:r>
-              <a:rPr lang="en-US" smtClean="0"/>
+              <a:rPr lang="en-US"/>
               <a:t>Second level</a:t>
             </a:r>
           </a:p>
           <a:p>
             <a:pPr lvl="2"/>
             <a:r>
-              <a:rPr lang="en-US" smtClean="0"/>
+              <a:rPr lang="en-US"/>
               <a:t>Third level</a:t>
             </a:r>
           </a:p>
           <a:p>
             <a:pPr lvl="3"/>
             <a:r>
-              <a:rPr lang="en-US" smtClean="0"/>
+              <a:rPr lang="en-US"/>
               <a:t>Fourth level</a:t>
             </a:r>
           </a:p>
           <a:p>
             <a:pPr lvl="4"/>
             <a:r>
-              <a:rPr lang="en-US" smtClean="0"/>
+              <a:rPr lang="en-US"/>
               <a:t>Fifth level</a:t>
             </a:r>
             <a:endParaRPr lang="de-AT"/>
@@ -595,7 +596,7 @@
           <a:p>
             <a:fld id="{E5B2F287-A29C-4C70-831C-74BFCFEDEFEA}" type="datetimeFigureOut">
               <a:rPr lang="de-AT" smtClean="0"/>
-              <a:t>27.12.2018</a:t>
+              <a:t>11.04.19</a:t>
             </a:fld>
             <a:endParaRPr lang="de-AT"/>
           </a:p>
@@ -689,7 +690,7 @@
           <a:lstStyle/>
           <a:p>
             <a:r>
-              <a:rPr lang="en-US" smtClean="0"/>
+              <a:rPr lang="en-US"/>
               <a:t>Click to edit Master title style</a:t>
             </a:r>
             <a:endParaRPr lang="de-AT"/>
@@ -713,35 +714,35 @@
           <a:p>
             <a:pPr lvl="0"/>
             <a:r>
-              <a:rPr lang="en-US" smtClean="0"/>
+              <a:rPr lang="en-US"/>
               <a:t>Edit Master text styles</a:t>
             </a:r>
           </a:p>
           <a:p>
             <a:pPr lvl="1"/>
             <a:r>
-              <a:rPr lang="en-US" smtClean="0"/>
+              <a:rPr lang="en-US"/>
               <a:t>Second level</a:t>
             </a:r>
           </a:p>
           <a:p>
             <a:pPr lvl="2"/>
             <a:r>
-              <a:rPr lang="en-US" smtClean="0"/>
+              <a:rPr lang="en-US"/>
               <a:t>Third level</a:t>
             </a:r>
           </a:p>
           <a:p>
             <a:pPr lvl="3"/>
             <a:r>
-              <a:rPr lang="en-US" smtClean="0"/>
+              <a:rPr lang="en-US"/>
               <a:t>Fourth level</a:t>
             </a:r>
           </a:p>
           <a:p>
             <a:pPr lvl="4"/>
             <a:r>
-              <a:rPr lang="en-US" smtClean="0"/>
+              <a:rPr lang="en-US"/>
               <a:t>Fifth level</a:t>
             </a:r>
             <a:endParaRPr lang="de-AT"/>
@@ -765,7 +766,7 @@
           <a:p>
             <a:fld id="{E5B2F287-A29C-4C70-831C-74BFCFEDEFEA}" type="datetimeFigureOut">
               <a:rPr lang="de-AT" smtClean="0"/>
-              <a:t>27.12.2018</a:t>
+              <a:t>11.04.19</a:t>
             </a:fld>
             <a:endParaRPr lang="de-AT"/>
           </a:p>
@@ -868,7 +869,7 @@
           </a:lstStyle>
           <a:p>
             <a:r>
-              <a:rPr lang="en-US" smtClean="0"/>
+              <a:rPr lang="en-US"/>
               <a:t>Click to edit Master title style</a:t>
             </a:r>
             <a:endParaRPr lang="de-AT"/>
@@ -988,7 +989,7 @@
           <a:p>
             <a:pPr lvl="0"/>
             <a:r>
-              <a:rPr lang="en-US" smtClean="0"/>
+              <a:rPr lang="en-US"/>
               <a:t>Edit Master text styles</a:t>
             </a:r>
           </a:p>
@@ -1011,7 +1012,7 @@
           <a:p>
             <a:fld id="{E5B2F287-A29C-4C70-831C-74BFCFEDEFEA}" type="datetimeFigureOut">
               <a:rPr lang="de-AT" smtClean="0"/>
-              <a:t>27.12.2018</a:t>
+              <a:t>11.04.19</a:t>
             </a:fld>
             <a:endParaRPr lang="de-AT"/>
           </a:p>
@@ -1105,7 +1106,7 @@
           <a:lstStyle/>
           <a:p>
             <a:r>
-              <a:rPr lang="en-US" smtClean="0"/>
+              <a:rPr lang="en-US"/>
               <a:t>Click to edit Master title style</a:t>
             </a:r>
             <a:endParaRPr lang="de-AT"/>
@@ -1134,35 +1135,35 @@
           <a:p>
             <a:pPr lvl="0"/>
             <a:r>
-              <a:rPr lang="en-US" smtClean="0"/>
+              <a:rPr lang="en-US"/>
               <a:t>Edit Master text styles</a:t>
             </a:r>
           </a:p>
           <a:p>
             <a:pPr lvl="1"/>
             <a:r>
-              <a:rPr lang="en-US" smtClean="0"/>
+              <a:rPr lang="en-US"/>
               <a:t>Second level</a:t>
             </a:r>
           </a:p>
           <a:p>
             <a:pPr lvl="2"/>
             <a:r>
-              <a:rPr lang="en-US" smtClean="0"/>
+              <a:rPr lang="en-US"/>
               <a:t>Third level</a:t>
             </a:r>
           </a:p>
           <a:p>
             <a:pPr lvl="3"/>
             <a:r>
-              <a:rPr lang="en-US" smtClean="0"/>
+              <a:rPr lang="en-US"/>
               <a:t>Fourth level</a:t>
             </a:r>
           </a:p>
           <a:p>
             <a:pPr lvl="4"/>
             <a:r>
-              <a:rPr lang="en-US" smtClean="0"/>
+              <a:rPr lang="en-US"/>
               <a:t>Fifth level</a:t>
             </a:r>
             <a:endParaRPr lang="de-AT"/>
@@ -1191,35 +1192,35 @@
           <a:p>
             <a:pPr lvl="0"/>
             <a:r>
-              <a:rPr lang="en-US" smtClean="0"/>
+              <a:rPr lang="en-US"/>
               <a:t>Edit Master text styles</a:t>
             </a:r>
           </a:p>
           <a:p>
             <a:pPr lvl="1"/>
             <a:r>
-              <a:rPr lang="en-US" smtClean="0"/>
+              <a:rPr lang="en-US"/>
               <a:t>Second level</a:t>
             </a:r>
           </a:p>
           <a:p>
             <a:pPr lvl="2"/>
             <a:r>
-              <a:rPr lang="en-US" smtClean="0"/>
+              <a:rPr lang="en-US"/>
               <a:t>Third level</a:t>
             </a:r>
           </a:p>
           <a:p>
             <a:pPr lvl="3"/>
             <a:r>
-              <a:rPr lang="en-US" smtClean="0"/>
+              <a:rPr lang="en-US"/>
               <a:t>Fourth level</a:t>
             </a:r>
           </a:p>
           <a:p>
             <a:pPr lvl="4"/>
             <a:r>
-              <a:rPr lang="en-US" smtClean="0"/>
+              <a:rPr lang="en-US"/>
               <a:t>Fifth level</a:t>
             </a:r>
             <a:endParaRPr lang="de-AT"/>
@@ -1243,7 +1244,7 @@
           <a:p>
             <a:fld id="{E5B2F287-A29C-4C70-831C-74BFCFEDEFEA}" type="datetimeFigureOut">
               <a:rPr lang="de-AT" smtClean="0"/>
-              <a:t>27.12.2018</a:t>
+              <a:t>11.04.19</a:t>
             </a:fld>
             <a:endParaRPr lang="de-AT"/>
           </a:p>
@@ -1342,7 +1343,7 @@
           <a:lstStyle/>
           <a:p>
             <a:r>
-              <a:rPr lang="en-US" smtClean="0"/>
+              <a:rPr lang="en-US"/>
               <a:t>Click to edit Master title style</a:t>
             </a:r>
             <a:endParaRPr lang="de-AT"/>
@@ -1408,7 +1409,7 @@
           <a:p>
             <a:pPr lvl="0"/>
             <a:r>
-              <a:rPr lang="en-US" smtClean="0"/>
+              <a:rPr lang="en-US"/>
               <a:t>Edit Master text styles</a:t>
             </a:r>
           </a:p>
@@ -1436,35 +1437,35 @@
           <a:p>
             <a:pPr lvl="0"/>
             <a:r>
-              <a:rPr lang="en-US" smtClean="0"/>
+              <a:rPr lang="en-US"/>
               <a:t>Edit Master text styles</a:t>
             </a:r>
           </a:p>
           <a:p>
             <a:pPr lvl="1"/>
             <a:r>
-              <a:rPr lang="en-US" smtClean="0"/>
+              <a:rPr lang="en-US"/>
               <a:t>Second level</a:t>
             </a:r>
           </a:p>
           <a:p>
             <a:pPr lvl="2"/>
             <a:r>
-              <a:rPr lang="en-US" smtClean="0"/>
+              <a:rPr lang="en-US"/>
               <a:t>Third level</a:t>
             </a:r>
           </a:p>
           <a:p>
             <a:pPr lvl="3"/>
             <a:r>
-              <a:rPr lang="en-US" smtClean="0"/>
+              <a:rPr lang="en-US"/>
               <a:t>Fourth level</a:t>
             </a:r>
           </a:p>
           <a:p>
             <a:pPr lvl="4"/>
             <a:r>
-              <a:rPr lang="en-US" smtClean="0"/>
+              <a:rPr lang="en-US"/>
               <a:t>Fifth level</a:t>
             </a:r>
             <a:endParaRPr lang="de-AT"/>
@@ -1530,7 +1531,7 @@
           <a:p>
             <a:pPr lvl="0"/>
             <a:r>
-              <a:rPr lang="en-US" smtClean="0"/>
+              <a:rPr lang="en-US"/>
               <a:t>Edit Master text styles</a:t>
             </a:r>
           </a:p>
@@ -1558,35 +1559,35 @@
           <a:p>
             <a:pPr lvl="0"/>
             <a:r>
-              <a:rPr lang="en-US" smtClean="0"/>
+              <a:rPr lang="en-US"/>
               <a:t>Edit Master text styles</a:t>
             </a:r>
           </a:p>
           <a:p>
             <a:pPr lvl="1"/>
             <a:r>
-              <a:rPr lang="en-US" smtClean="0"/>
+              <a:rPr lang="en-US"/>
               <a:t>Second level</a:t>
             </a:r>
           </a:p>
           <a:p>
             <a:pPr lvl="2"/>
             <a:r>
-              <a:rPr lang="en-US" smtClean="0"/>
+              <a:rPr lang="en-US"/>
               <a:t>Third level</a:t>
             </a:r>
           </a:p>
           <a:p>
             <a:pPr lvl="3"/>
             <a:r>
-              <a:rPr lang="en-US" smtClean="0"/>
+              <a:rPr lang="en-US"/>
               <a:t>Fourth level</a:t>
             </a:r>
           </a:p>
           <a:p>
             <a:pPr lvl="4"/>
             <a:r>
-              <a:rPr lang="en-US" smtClean="0"/>
+              <a:rPr lang="en-US"/>
               <a:t>Fifth level</a:t>
             </a:r>
             <a:endParaRPr lang="de-AT"/>
@@ -1610,7 +1611,7 @@
           <a:p>
             <a:fld id="{E5B2F287-A29C-4C70-831C-74BFCFEDEFEA}" type="datetimeFigureOut">
               <a:rPr lang="de-AT" smtClean="0"/>
-              <a:t>27.12.2018</a:t>
+              <a:t>11.04.19</a:t>
             </a:fld>
             <a:endParaRPr lang="de-AT"/>
           </a:p>
@@ -1704,7 +1705,7 @@
           <a:lstStyle/>
           <a:p>
             <a:r>
-              <a:rPr lang="en-US" smtClean="0"/>
+              <a:rPr lang="en-US"/>
               <a:t>Click to edit Master title style</a:t>
             </a:r>
             <a:endParaRPr lang="de-AT"/>
@@ -1728,7 +1729,7 @@
           <a:p>
             <a:fld id="{E5B2F287-A29C-4C70-831C-74BFCFEDEFEA}" type="datetimeFigureOut">
               <a:rPr lang="de-AT" smtClean="0"/>
-              <a:t>27.12.2018</a:t>
+              <a:t>11.04.19</a:t>
             </a:fld>
             <a:endParaRPr lang="de-AT"/>
           </a:p>
@@ -1823,7 +1824,7 @@
           <a:p>
             <a:fld id="{E5B2F287-A29C-4C70-831C-74BFCFEDEFEA}" type="datetimeFigureOut">
               <a:rPr lang="de-AT" smtClean="0"/>
-              <a:t>27.12.2018</a:t>
+              <a:t>11.04.19</a:t>
             </a:fld>
             <a:endParaRPr lang="de-AT"/>
           </a:p>
@@ -1926,7 +1927,7 @@
           </a:lstStyle>
           <a:p>
             <a:r>
-              <a:rPr lang="en-US" smtClean="0"/>
+              <a:rPr lang="en-US"/>
               <a:t>Click to edit Master title style</a:t>
             </a:r>
             <a:endParaRPr lang="de-AT"/>
@@ -1983,35 +1984,35 @@
           <a:p>
             <a:pPr lvl="0"/>
             <a:r>
-              <a:rPr lang="en-US" smtClean="0"/>
+              <a:rPr lang="en-US"/>
               <a:t>Edit Master text styles</a:t>
             </a:r>
           </a:p>
           <a:p>
             <a:pPr lvl="1"/>
             <a:r>
-              <a:rPr lang="en-US" smtClean="0"/>
+              <a:rPr lang="en-US"/>
               <a:t>Second level</a:t>
             </a:r>
           </a:p>
           <a:p>
             <a:pPr lvl="2"/>
             <a:r>
-              <a:rPr lang="en-US" smtClean="0"/>
+              <a:rPr lang="en-US"/>
               <a:t>Third level</a:t>
             </a:r>
           </a:p>
           <a:p>
             <a:pPr lvl="3"/>
             <a:r>
-              <a:rPr lang="en-US" smtClean="0"/>
+              <a:rPr lang="en-US"/>
               <a:t>Fourth level</a:t>
             </a:r>
           </a:p>
           <a:p>
             <a:pPr lvl="4"/>
             <a:r>
-              <a:rPr lang="en-US" smtClean="0"/>
+              <a:rPr lang="en-US"/>
               <a:t>Fifth level</a:t>
             </a:r>
             <a:endParaRPr lang="de-AT"/>
@@ -2077,7 +2078,7 @@
           <a:p>
             <a:pPr lvl="0"/>
             <a:r>
-              <a:rPr lang="en-US" smtClean="0"/>
+              <a:rPr lang="en-US"/>
               <a:t>Edit Master text styles</a:t>
             </a:r>
           </a:p>
@@ -2100,7 +2101,7 @@
           <a:p>
             <a:fld id="{E5B2F287-A29C-4C70-831C-74BFCFEDEFEA}" type="datetimeFigureOut">
               <a:rPr lang="de-AT" smtClean="0"/>
-              <a:t>27.12.2018</a:t>
+              <a:t>11.04.19</a:t>
             </a:fld>
             <a:endParaRPr lang="de-AT"/>
           </a:p>
@@ -2203,7 +2204,7 @@
           </a:lstStyle>
           <a:p>
             <a:r>
-              <a:rPr lang="en-US" smtClean="0"/>
+              <a:rPr lang="en-US"/>
               <a:t>Click to edit Master title style</a:t>
             </a:r>
             <a:endParaRPr lang="de-AT"/>
@@ -2330,7 +2331,7 @@
           <a:p>
             <a:pPr lvl="0"/>
             <a:r>
-              <a:rPr lang="en-US" smtClean="0"/>
+              <a:rPr lang="en-US"/>
               <a:t>Edit Master text styles</a:t>
             </a:r>
           </a:p>
@@ -2353,7 +2354,7 @@
           <a:p>
             <a:fld id="{E5B2F287-A29C-4C70-831C-74BFCFEDEFEA}" type="datetimeFigureOut">
               <a:rPr lang="de-AT" smtClean="0"/>
-              <a:t>27.12.2018</a:t>
+              <a:t>11.04.19</a:t>
             </a:fld>
             <a:endParaRPr lang="de-AT"/>
           </a:p>
@@ -2462,7 +2463,7 @@
           <a:lstStyle/>
           <a:p>
             <a:r>
-              <a:rPr lang="en-US" smtClean="0"/>
+              <a:rPr lang="en-US"/>
               <a:t>Click to edit Master title style</a:t>
             </a:r>
             <a:endParaRPr lang="de-AT"/>
@@ -2496,35 +2497,35 @@
           <a:p>
             <a:pPr lvl="0"/>
             <a:r>
-              <a:rPr lang="en-US" smtClean="0"/>
+              <a:rPr lang="en-US"/>
               <a:t>Edit Master text styles</a:t>
             </a:r>
           </a:p>
           <a:p>
             <a:pPr lvl="1"/>
             <a:r>
-              <a:rPr lang="en-US" smtClean="0"/>
+              <a:rPr lang="en-US"/>
               <a:t>Second level</a:t>
             </a:r>
           </a:p>
           <a:p>
             <a:pPr lvl="2"/>
             <a:r>
-              <a:rPr lang="en-US" smtClean="0"/>
+              <a:rPr lang="en-US"/>
               <a:t>Third level</a:t>
             </a:r>
           </a:p>
           <a:p>
             <a:pPr lvl="3"/>
             <a:r>
-              <a:rPr lang="en-US" smtClean="0"/>
+              <a:rPr lang="en-US"/>
               <a:t>Fourth level</a:t>
             </a:r>
           </a:p>
           <a:p>
             <a:pPr lvl="4"/>
             <a:r>
-              <a:rPr lang="en-US" smtClean="0"/>
+              <a:rPr lang="en-US"/>
               <a:t>Fifth level</a:t>
             </a:r>
             <a:endParaRPr lang="de-AT"/>
@@ -2566,7 +2567,7 @@
           <a:p>
             <a:fld id="{E5B2F287-A29C-4C70-831C-74BFCFEDEFEA}" type="datetimeFigureOut">
               <a:rPr lang="de-AT" smtClean="0"/>
-              <a:t>27.12.2018</a:t>
+              <a:t>11.04.19</a:t>
             </a:fld>
             <a:endParaRPr lang="de-AT"/>
           </a:p>
@@ -3147,10 +3148,9 @@
           <a:lstStyle/>
           <a:p>
             <a:r>
-              <a:rPr lang="en-US" dirty="0" smtClean="0"/>
+              <a:rPr lang="en-US" dirty="0"/>
               <a:t>Certificate Authority (CA)</a:t>
             </a:r>
-            <a:endParaRPr lang="en-US" dirty="0"/>
           </a:p>
         </p:txBody>
       </p:sp>
@@ -3201,10 +3201,9 @@
           <a:lstStyle/>
           <a:p>
             <a:r>
-              <a:rPr lang="en-US" dirty="0" smtClean="0"/>
+              <a:rPr lang="en-US" dirty="0"/>
               <a:t>Software publisher</a:t>
             </a:r>
-            <a:endParaRPr lang="en-US" dirty="0"/>
           </a:p>
         </p:txBody>
       </p:sp>
@@ -3256,10 +3255,9 @@
           <a:p>
             <a:pPr algn="ctr"/>
             <a:r>
-              <a:rPr lang="en-US" dirty="0" smtClean="0"/>
+              <a:rPr lang="en-US" dirty="0"/>
               <a:t>User</a:t>
             </a:r>
-            <a:endParaRPr lang="en-US" dirty="0"/>
           </a:p>
         </p:txBody>
       </p:sp>
@@ -3310,10 +3308,9 @@
           <a:lstStyle/>
           <a:p>
             <a:r>
-              <a:rPr lang="en-US" dirty="0" smtClean="0"/>
+              <a:rPr lang="en-US" dirty="0"/>
               <a:t>OS/browser/…</a:t>
             </a:r>
-            <a:endParaRPr lang="en-US" dirty="0"/>
           </a:p>
         </p:txBody>
       </p:sp>
@@ -3364,10 +3361,9 @@
           <a:lstStyle/>
           <a:p>
             <a:r>
-              <a:rPr lang="en-US" sz="1400" dirty="0" smtClean="0"/>
+              <a:rPr lang="en-US" sz="1400" dirty="0"/>
               <a:t>Publisher certificate</a:t>
             </a:r>
-            <a:endParaRPr lang="en-US" sz="1400" dirty="0"/>
           </a:p>
         </p:txBody>
       </p:sp>
@@ -3418,10 +3414,9 @@
           <a:lstStyle/>
           <a:p>
             <a:r>
-              <a:rPr lang="en-US" sz="1200" dirty="0" smtClean="0"/>
+              <a:rPr lang="en-US" sz="1200" dirty="0"/>
               <a:t>Private Key</a:t>
             </a:r>
-            <a:endParaRPr lang="en-US" sz="1200" dirty="0"/>
           </a:p>
         </p:txBody>
       </p:sp>
@@ -3481,24 +3476,23 @@
           <a:lstStyle/>
           <a:p>
             <a:r>
-              <a:rPr lang="en-US" sz="1200" b="1" dirty="0" smtClean="0"/>
+              <a:rPr lang="en-US" sz="1200" b="1" dirty="0"/>
               <a:t>(1)</a:t>
             </a:r>
             <a:br>
-              <a:rPr lang="en-US" sz="1200" b="1" dirty="0" smtClean="0"/>
+              <a:rPr lang="en-US" sz="1200" b="1" dirty="0"/>
             </a:br>
             <a:r>
-              <a:rPr lang="en-US" sz="1200" dirty="0" smtClean="0"/>
+              <a:rPr lang="en-US" sz="1200" dirty="0"/>
               <a:t>identify and </a:t>
             </a:r>
             <a:br>
-              <a:rPr lang="en-US" sz="1200" dirty="0" smtClean="0"/>
+              <a:rPr lang="en-US" sz="1200" dirty="0"/>
             </a:br>
             <a:r>
-              <a:rPr lang="en-US" sz="1200" dirty="0" smtClean="0"/>
+              <a:rPr lang="en-US" sz="1200" dirty="0"/>
               <a:t>purchase</a:t>
             </a:r>
-            <a:endParaRPr lang="en-US" sz="1200" dirty="0"/>
           </a:p>
         </p:txBody>
       </p:sp>
@@ -3561,35 +3555,34 @@
           <a:p>
             <a:pPr algn="r"/>
             <a:r>
-              <a:rPr lang="en-US" sz="1200" b="1" dirty="0" smtClean="0"/>
+              <a:rPr lang="en-US" sz="1200" b="1" dirty="0"/>
               <a:t>(2)</a:t>
             </a:r>
             <a:r>
-              <a:rPr lang="en-US" sz="1200" dirty="0" smtClean="0"/>
+              <a:rPr lang="en-US" sz="1200" dirty="0"/>
               <a:t>     </a:t>
             </a:r>
             <a:br>
-              <a:rPr lang="en-US" sz="1200" dirty="0" smtClean="0"/>
+              <a:rPr lang="en-US" sz="1200" dirty="0"/>
             </a:br>
             <a:r>
-              <a:rPr lang="en-US" sz="1200" dirty="0" smtClean="0"/>
+              <a:rPr lang="en-US" sz="1200" dirty="0"/>
               <a:t>issue    </a:t>
             </a:r>
             <a:br>
-              <a:rPr lang="en-US" sz="1200" dirty="0" smtClean="0"/>
+              <a:rPr lang="en-US" sz="1200" dirty="0"/>
             </a:br>
             <a:r>
-              <a:rPr lang="en-US" sz="1200" dirty="0" smtClean="0"/>
+              <a:rPr lang="en-US" sz="1200" dirty="0"/>
               <a:t>publisher   </a:t>
             </a:r>
             <a:br>
-              <a:rPr lang="en-US" sz="1200" dirty="0" smtClean="0"/>
+              <a:rPr lang="en-US" sz="1200" dirty="0"/>
             </a:br>
             <a:r>
-              <a:rPr lang="en-US" sz="1200" dirty="0" smtClean="0"/>
+              <a:rPr lang="en-US" sz="1200" dirty="0"/>
               <a:t>certificate</a:t>
             </a:r>
-            <a:endParaRPr lang="en-US" sz="1200" dirty="0"/>
           </a:p>
         </p:txBody>
       </p:sp>
@@ -3651,21 +3644,20 @@
           <a:lstStyle/>
           <a:p>
             <a:r>
-              <a:rPr lang="en-US" sz="1200" b="1" dirty="0" smtClean="0"/>
+              <a:rPr lang="en-US" sz="1200" b="1" dirty="0"/>
               <a:t>(3)</a:t>
             </a:r>
             <a:r>
-              <a:rPr lang="en-US" sz="1200" dirty="0" smtClean="0"/>
+              <a:rPr lang="en-US" sz="1200" dirty="0"/>
               <a:t> sign </a:t>
             </a:r>
             <a:br>
-              <a:rPr lang="en-US" sz="1200" dirty="0" smtClean="0"/>
+              <a:rPr lang="en-US" sz="1200" dirty="0"/>
             </a:br>
             <a:r>
-              <a:rPr lang="en-US" sz="1200" dirty="0" smtClean="0"/>
+              <a:rPr lang="en-US" sz="1200" dirty="0"/>
               <a:t> software</a:t>
             </a:r>
-            <a:endParaRPr lang="en-US" sz="1200" dirty="0"/>
           </a:p>
         </p:txBody>
       </p:sp>
@@ -3692,21 +3684,20 @@
           <a:lstStyle/>
           <a:p>
             <a:r>
-              <a:rPr lang="en-US" sz="1200" b="1" dirty="0" smtClean="0"/>
+              <a:rPr lang="en-US" sz="1200" b="1" dirty="0"/>
               <a:t>              (4)</a:t>
             </a:r>
             <a:r>
-              <a:rPr lang="en-US" sz="1200" dirty="0" smtClean="0"/>
+              <a:rPr lang="en-US" sz="1200" dirty="0"/>
               <a:t> ship</a:t>
             </a:r>
             <a:br>
-              <a:rPr lang="en-US" sz="1200" dirty="0" smtClean="0"/>
+              <a:rPr lang="en-US" sz="1200" dirty="0"/>
             </a:br>
             <a:r>
-              <a:rPr lang="en-US" sz="1200" dirty="0" smtClean="0"/>
+              <a:rPr lang="en-US" sz="1200" dirty="0"/>
               <a:t>  signed software</a:t>
             </a:r>
-            <a:endParaRPr lang="en-US" sz="1200" dirty="0"/>
           </a:p>
         </p:txBody>
       </p:sp>
@@ -3804,14 +3795,13 @@
           <a:p>
             <a:pPr algn="r"/>
             <a:r>
-              <a:rPr lang="en-US" sz="1200" b="1" dirty="0" smtClean="0"/>
+              <a:rPr lang="en-US" sz="1200" b="1" dirty="0"/>
               <a:t>(5)</a:t>
             </a:r>
             <a:r>
-              <a:rPr lang="en-US" sz="1200" dirty="0" smtClean="0"/>
+              <a:rPr lang="en-US" sz="1200" dirty="0"/>
               <a:t> download software    </a:t>
             </a:r>
-            <a:endParaRPr lang="en-US" sz="1200" dirty="0"/>
           </a:p>
         </p:txBody>
       </p:sp>
@@ -3838,33 +3828,20 @@
           <a:lstStyle/>
           <a:p>
             <a:r>
-              <a:rPr lang="en-US" sz="1200" b="1" dirty="0" smtClean="0"/>
-              <a:t>    </a:t>
-            </a:r>
-            <a:r>
-              <a:rPr lang="en-US" sz="1200" b="1" dirty="0" smtClean="0"/>
-              <a:t>(7)</a:t>
-            </a:r>
-            <a:r>
-              <a:rPr lang="en-US" sz="1200" dirty="0" smtClean="0"/>
-              <a:t> </a:t>
-            </a:r>
-            <a:r>
-              <a:rPr lang="en-US" sz="1200" dirty="0" smtClean="0"/>
-              <a:t>run/install,</a:t>
+              <a:rPr lang="en-US" sz="1200" b="1" dirty="0"/>
+              <a:t>    (7)</a:t>
+            </a:r>
+            <a:r>
+              <a:rPr lang="en-US" sz="1200" dirty="0"/>
+              <a:t> run/install,</a:t>
             </a:r>
             <a:br>
-              <a:rPr lang="en-US" sz="1200" dirty="0" smtClean="0"/>
+              <a:rPr lang="en-US" sz="1200" dirty="0"/>
             </a:br>
             <a:r>
-              <a:rPr lang="en-US" sz="1200" dirty="0" smtClean="0"/>
-              <a:t>warn user, or </a:t>
-            </a:r>
-            <a:r>
-              <a:rPr lang="en-US" sz="1200" dirty="0" smtClean="0"/>
-              <a:t>abort</a:t>
-            </a:r>
-            <a:endParaRPr lang="en-US" sz="1200" dirty="0"/>
+              <a:rPr lang="en-US" sz="1200" dirty="0"/>
+              <a:t>warn user, or abort</a:t>
+            </a:r>
           </a:p>
         </p:txBody>
       </p:sp>
@@ -3925,14 +3902,13 @@
           <a:p>
             <a:pPr algn="ctr"/>
             <a:r>
-              <a:rPr lang="en-US" sz="1200" b="1" dirty="0" smtClean="0"/>
+              <a:rPr lang="en-US" sz="1200" b="1" dirty="0"/>
               <a:t>(6)</a:t>
             </a:r>
             <a:r>
-              <a:rPr lang="en-US" sz="1200" dirty="0" smtClean="0"/>
+              <a:rPr lang="en-US" sz="1200" dirty="0"/>
               <a:t> check signature and certificate</a:t>
             </a:r>
-            <a:endParaRPr lang="en-US" sz="1200" dirty="0"/>
           </a:p>
         </p:txBody>
       </p:sp>
@@ -4683,10 +4659,9 @@
           <a:lstStyle/>
           <a:p>
             <a:r>
-              <a:rPr lang="en-US" dirty="0" smtClean="0"/>
+              <a:rPr lang="en-US" dirty="0"/>
               <a:t>Certificate Authority (CA)</a:t>
             </a:r>
-            <a:endParaRPr lang="en-US" dirty="0"/>
           </a:p>
         </p:txBody>
       </p:sp>
@@ -4737,10 +4712,9 @@
           <a:lstStyle/>
           <a:p>
             <a:r>
-              <a:rPr lang="en-US" dirty="0" smtClean="0"/>
+              <a:rPr lang="en-US" dirty="0"/>
               <a:t>Software publisher</a:t>
             </a:r>
-            <a:endParaRPr lang="en-US" dirty="0"/>
           </a:p>
         </p:txBody>
       </p:sp>
@@ -4792,10 +4766,9 @@
           <a:p>
             <a:pPr algn="ctr"/>
             <a:r>
-              <a:rPr lang="en-US" dirty="0" smtClean="0"/>
+              <a:rPr lang="en-US" dirty="0"/>
               <a:t>User</a:t>
             </a:r>
-            <a:endParaRPr lang="en-US" dirty="0"/>
           </a:p>
         </p:txBody>
       </p:sp>
@@ -4846,10 +4819,9 @@
           <a:lstStyle/>
           <a:p>
             <a:r>
-              <a:rPr lang="en-US" dirty="0" smtClean="0"/>
+              <a:rPr lang="en-US" dirty="0"/>
               <a:t>OS/Browser/…</a:t>
             </a:r>
-            <a:endParaRPr lang="en-US" dirty="0"/>
           </a:p>
         </p:txBody>
       </p:sp>
@@ -4897,18 +4869,13 @@
           <a:lstStyle/>
           <a:p>
             <a:r>
-              <a:rPr lang="en-US" dirty="0" smtClean="0">
+              <a:rPr lang="en-US" dirty="0">
                 <a:solidFill>
                   <a:schemeClr val="bg1"/>
                 </a:solidFill>
               </a:rPr>
               <a:t>Microsoft SmartScreen</a:t>
             </a:r>
-            <a:endParaRPr lang="en-US" dirty="0">
-              <a:solidFill>
-                <a:schemeClr val="bg1"/>
-              </a:solidFill>
-            </a:endParaRPr>
           </a:p>
         </p:txBody>
       </p:sp>
@@ -4959,10 +4926,9 @@
           <a:lstStyle/>
           <a:p>
             <a:r>
-              <a:rPr lang="en-US" sz="1400" dirty="0" smtClean="0"/>
+              <a:rPr lang="en-US" sz="1400" dirty="0"/>
               <a:t>Root certificate</a:t>
             </a:r>
-            <a:endParaRPr lang="en-US" sz="1400" dirty="0"/>
           </a:p>
         </p:txBody>
       </p:sp>
@@ -5013,10 +4979,9 @@
           <a:lstStyle/>
           <a:p>
             <a:r>
-              <a:rPr lang="en-US" sz="1400" dirty="0" smtClean="0"/>
+              <a:rPr lang="en-US" sz="1400" dirty="0"/>
               <a:t>Revocation server</a:t>
             </a:r>
-            <a:endParaRPr lang="en-US" sz="1400" dirty="0"/>
           </a:p>
         </p:txBody>
       </p:sp>
@@ -5067,10 +5032,9 @@
           <a:lstStyle/>
           <a:p>
             <a:r>
-              <a:rPr lang="en-US" sz="1200" dirty="0" smtClean="0"/>
+              <a:rPr lang="en-US" sz="1200" dirty="0"/>
               <a:t>Private key</a:t>
             </a:r>
-            <a:endParaRPr lang="en-US" sz="1200" dirty="0"/>
           </a:p>
         </p:txBody>
       </p:sp>
@@ -5121,10 +5085,9 @@
           <a:lstStyle/>
           <a:p>
             <a:r>
-              <a:rPr lang="en-US" sz="1400" dirty="0" smtClean="0"/>
+              <a:rPr lang="en-US" sz="1400" dirty="0"/>
               <a:t>Timestamp Authority (TSA)</a:t>
             </a:r>
-            <a:endParaRPr lang="en-US" sz="1400" dirty="0"/>
           </a:p>
         </p:txBody>
       </p:sp>
@@ -5175,10 +5138,9 @@
           <a:lstStyle/>
           <a:p>
             <a:r>
-              <a:rPr lang="en-US" sz="1400" dirty="0" smtClean="0"/>
+              <a:rPr lang="en-US" sz="1400" dirty="0"/>
               <a:t>Publisher certificate</a:t>
             </a:r>
-            <a:endParaRPr lang="en-US" sz="1400" dirty="0"/>
           </a:p>
         </p:txBody>
       </p:sp>
@@ -5229,10 +5191,9 @@
           <a:lstStyle/>
           <a:p>
             <a:r>
-              <a:rPr lang="en-US" sz="1200" dirty="0" smtClean="0"/>
+              <a:rPr lang="en-US" sz="1200" dirty="0"/>
               <a:t>Private Key</a:t>
             </a:r>
-            <a:endParaRPr lang="en-US" sz="1200" dirty="0"/>
           </a:p>
         </p:txBody>
       </p:sp>
@@ -5292,28 +5253,23 @@
           <a:lstStyle/>
           <a:p>
             <a:r>
-              <a:rPr lang="en-US" sz="1200" b="1" dirty="0" smtClean="0"/>
+              <a:rPr lang="en-US" sz="1200" b="1" dirty="0"/>
               <a:t>(1)</a:t>
             </a:r>
-            <a:r>
-              <a:rPr lang="en-US" sz="1200" dirty="0" smtClean="0"/>
-              <a:t/>
-            </a:r>
             <a:br>
-              <a:rPr lang="en-US" sz="1200" dirty="0" smtClean="0"/>
+              <a:rPr lang="en-US" sz="1200" dirty="0"/>
             </a:br>
             <a:r>
-              <a:rPr lang="en-US" sz="1200" dirty="0" smtClean="0"/>
+              <a:rPr lang="en-US" sz="1200" dirty="0"/>
               <a:t>identify and </a:t>
             </a:r>
             <a:br>
-              <a:rPr lang="en-US" sz="1200" dirty="0" smtClean="0"/>
+              <a:rPr lang="en-US" sz="1200" dirty="0"/>
             </a:br>
             <a:r>
-              <a:rPr lang="en-US" sz="1200" dirty="0" smtClean="0"/>
+              <a:rPr lang="en-US" sz="1200" dirty="0"/>
               <a:t>purchase</a:t>
             </a:r>
-            <a:endParaRPr lang="en-US" sz="1200" dirty="0"/>
           </a:p>
         </p:txBody>
       </p:sp>
@@ -5378,18 +5334,13 @@
             <a:lstStyle/>
             <a:p>
               <a:r>
-                <a:rPr lang="en-US" sz="1400" dirty="0" smtClean="0">
+                <a:rPr lang="en-US" sz="1400" dirty="0">
                   <a:solidFill>
                     <a:schemeClr val="bg1"/>
                   </a:solidFill>
                 </a:rPr>
                 <a:t>Root certificates</a:t>
               </a:r>
-              <a:endParaRPr lang="en-US" sz="1400" dirty="0">
-                <a:solidFill>
-                  <a:schemeClr val="bg1"/>
-                </a:solidFill>
-              </a:endParaRPr>
             </a:p>
           </p:txBody>
         </p:sp>
@@ -5440,18 +5391,13 @@
             <a:lstStyle/>
             <a:p>
               <a:r>
-                <a:rPr lang="en-US" sz="1400" dirty="0" smtClean="0">
+                <a:rPr lang="en-US" sz="1400" dirty="0">
                   <a:solidFill>
                     <a:schemeClr val="bg1"/>
                   </a:solidFill>
                 </a:rPr>
                 <a:t>Root certificates</a:t>
               </a:r>
-              <a:endParaRPr lang="en-US" sz="1400" dirty="0">
-                <a:solidFill>
-                  <a:schemeClr val="bg1"/>
-                </a:solidFill>
-              </a:endParaRPr>
             </a:p>
           </p:txBody>
         </p:sp>
@@ -5502,10 +5448,9 @@
             <a:lstStyle/>
             <a:p>
               <a:r>
-                <a:rPr lang="en-US" sz="1400" dirty="0" smtClean="0"/>
+                <a:rPr lang="en-US" sz="1400" dirty="0"/>
                 <a:t>Root certificates</a:t>
               </a:r>
-              <a:endParaRPr lang="en-US" sz="1400" dirty="0"/>
             </a:p>
           </p:txBody>
         </p:sp>
@@ -5569,35 +5514,30 @@
           <a:p>
             <a:pPr algn="r"/>
             <a:r>
-              <a:rPr lang="en-US" sz="1200" b="1" dirty="0" smtClean="0"/>
+              <a:rPr lang="en-US" sz="1200" b="1" dirty="0"/>
               <a:t>(2)     </a:t>
             </a:r>
-            <a:r>
-              <a:rPr lang="en-US" sz="1200" dirty="0" smtClean="0"/>
-              <a:t/>
-            </a:r>
             <a:br>
-              <a:rPr lang="en-US" sz="1200" dirty="0" smtClean="0"/>
+              <a:rPr lang="en-US" sz="1200" dirty="0"/>
             </a:br>
             <a:r>
-              <a:rPr lang="en-US" sz="1200" dirty="0" smtClean="0"/>
+              <a:rPr lang="en-US" sz="1200" dirty="0"/>
               <a:t>issue    </a:t>
             </a:r>
             <a:br>
-              <a:rPr lang="en-US" sz="1200" dirty="0" smtClean="0"/>
+              <a:rPr lang="en-US" sz="1200" dirty="0"/>
             </a:br>
             <a:r>
-              <a:rPr lang="en-US" sz="1200" dirty="0" smtClean="0"/>
+              <a:rPr lang="en-US" sz="1200" dirty="0"/>
               <a:t>publisher   </a:t>
             </a:r>
             <a:br>
-              <a:rPr lang="en-US" sz="1200" dirty="0" smtClean="0"/>
+              <a:rPr lang="en-US" sz="1200" dirty="0"/>
             </a:br>
             <a:r>
-              <a:rPr lang="en-US" sz="1200" dirty="0" smtClean="0"/>
+              <a:rPr lang="en-US" sz="1200" dirty="0"/>
               <a:t>certificate</a:t>
             </a:r>
-            <a:endParaRPr lang="en-US" sz="1200" dirty="0"/>
           </a:p>
         </p:txBody>
       </p:sp>
@@ -5659,21 +5599,20 @@
           <a:lstStyle/>
           <a:p>
             <a:r>
-              <a:rPr lang="en-US" sz="1200" b="1" dirty="0" smtClean="0"/>
+              <a:rPr lang="en-US" sz="1200" b="1" dirty="0"/>
               <a:t>(3)</a:t>
             </a:r>
             <a:r>
-              <a:rPr lang="en-US" sz="1200" dirty="0" smtClean="0"/>
+              <a:rPr lang="en-US" sz="1200" dirty="0"/>
               <a:t> sign </a:t>
             </a:r>
             <a:br>
-              <a:rPr lang="en-US" sz="1200" dirty="0" smtClean="0"/>
+              <a:rPr lang="en-US" sz="1200" dirty="0"/>
             </a:br>
             <a:r>
-              <a:rPr lang="en-US" sz="1200" dirty="0" smtClean="0"/>
+              <a:rPr lang="en-US" sz="1200" dirty="0"/>
               <a:t> software</a:t>
             </a:r>
-            <a:endParaRPr lang="en-US" sz="1200" dirty="0"/>
           </a:p>
         </p:txBody>
       </p:sp>
@@ -5700,21 +5639,20 @@
           <a:lstStyle/>
           <a:p>
             <a:r>
-              <a:rPr lang="en-US" sz="1200" b="1" dirty="0" smtClean="0"/>
+              <a:rPr lang="en-US" sz="1200" b="1" dirty="0"/>
               <a:t>              (4)</a:t>
             </a:r>
             <a:r>
-              <a:rPr lang="en-US" sz="1200" dirty="0" smtClean="0"/>
+              <a:rPr lang="en-US" sz="1200" dirty="0"/>
               <a:t> ship</a:t>
             </a:r>
             <a:br>
-              <a:rPr lang="en-US" sz="1200" dirty="0" smtClean="0"/>
+              <a:rPr lang="en-US" sz="1200" dirty="0"/>
             </a:br>
             <a:r>
-              <a:rPr lang="en-US" sz="1200" dirty="0" smtClean="0"/>
+              <a:rPr lang="en-US" sz="1200" dirty="0"/>
               <a:t>  signed software</a:t>
             </a:r>
-            <a:endParaRPr lang="en-US" sz="1200" dirty="0"/>
           </a:p>
         </p:txBody>
       </p:sp>
@@ -5812,14 +5750,13 @@
           <a:p>
             <a:pPr algn="r"/>
             <a:r>
-              <a:rPr lang="en-US" sz="1200" b="1" dirty="0" smtClean="0"/>
+              <a:rPr lang="en-US" sz="1200" b="1" dirty="0"/>
               <a:t>(5)</a:t>
             </a:r>
             <a:r>
-              <a:rPr lang="en-US" sz="1200" dirty="0" smtClean="0"/>
+              <a:rPr lang="en-US" sz="1200" dirty="0"/>
               <a:t> download software    </a:t>
             </a:r>
-            <a:endParaRPr lang="en-US" sz="1200" dirty="0"/>
           </a:p>
         </p:txBody>
       </p:sp>
@@ -5846,21 +5783,20 @@
           <a:lstStyle/>
           <a:p>
             <a:r>
-              <a:rPr lang="en-US" sz="1200" b="1" dirty="0" smtClean="0"/>
+              <a:rPr lang="en-US" sz="1200" b="1" dirty="0"/>
               <a:t>    (8)</a:t>
             </a:r>
             <a:r>
-              <a:rPr lang="en-US" sz="1200" dirty="0" smtClean="0"/>
+              <a:rPr lang="en-US" sz="1200" dirty="0"/>
               <a:t> run/install,</a:t>
             </a:r>
             <a:br>
-              <a:rPr lang="en-US" sz="1200" dirty="0" smtClean="0"/>
+              <a:rPr lang="en-US" sz="1200" dirty="0"/>
             </a:br>
             <a:r>
-              <a:rPr lang="en-US" sz="1200" dirty="0" smtClean="0"/>
+              <a:rPr lang="en-US" sz="1200" dirty="0"/>
               <a:t>or warn user</a:t>
             </a:r>
-            <a:endParaRPr lang="en-US" sz="1200" dirty="0"/>
           </a:p>
         </p:txBody>
       </p:sp>
@@ -5921,14 +5857,13 @@
           <a:p>
             <a:pPr algn="ctr"/>
             <a:r>
-              <a:rPr lang="en-US" sz="1200" b="1" dirty="0" smtClean="0"/>
+              <a:rPr lang="en-US" sz="1200" b="1" dirty="0"/>
               <a:t>(6)</a:t>
             </a:r>
             <a:r>
-              <a:rPr lang="en-US" sz="1200" dirty="0" smtClean="0"/>
+              <a:rPr lang="en-US" sz="1200" dirty="0"/>
               <a:t> check signature and certificate</a:t>
             </a:r>
-            <a:endParaRPr lang="en-US" sz="1200" dirty="0"/>
           </a:p>
         </p:txBody>
       </p:sp>
@@ -6406,23 +6341,7 @@
                   <a:ea typeface="Calibri" panose="020F0502020204030204" pitchFamily="34" charset="0"/>
                   <a:cs typeface="Times New Roman" panose="02020603050405020304" pitchFamily="18" charset="0"/>
                 </a:rPr>
-                <a:t>CA </a:t>
-              </a:r>
-              <a:r>
-                <a:rPr lang="en-US" sz="1100" dirty="0" smtClean="0">
-                  <a:latin typeface="Calibri" panose="020F0502020204030204" pitchFamily="34" charset="0"/>
-                  <a:ea typeface="Calibri" panose="020F0502020204030204" pitchFamily="34" charset="0"/>
-                  <a:cs typeface="Times New Roman" panose="02020603050405020304" pitchFamily="18" charset="0"/>
-                </a:rPr>
-                <a:t>intermediate  </a:t>
-              </a:r>
-              <a:r>
-                <a:rPr lang="en-US" sz="1100" dirty="0">
-                  <a:latin typeface="Calibri" panose="020F0502020204030204" pitchFamily="34" charset="0"/>
-                  <a:ea typeface="Calibri" panose="020F0502020204030204" pitchFamily="34" charset="0"/>
-                  <a:cs typeface="Times New Roman" panose="02020603050405020304" pitchFamily="18" charset="0"/>
-                </a:rPr>
-                <a:t>certificate</a:t>
+                <a:t>CA intermediate  certificate</a:t>
               </a:r>
               <a:endParaRPr lang="de-AT" sz="1100" dirty="0"/>
             </a:p>
@@ -6450,7 +6369,7 @@
             <a:lstStyle/>
             <a:p>
               <a:r>
-                <a:rPr lang="en-US" sz="1100" dirty="0" smtClean="0">
+                <a:rPr lang="en-US" sz="1100" dirty="0">
                   <a:latin typeface="Calibri" panose="020F0502020204030204" pitchFamily="34" charset="0"/>
                   <a:ea typeface="Calibri" panose="020F0502020204030204" pitchFamily="34" charset="0"/>
                   <a:cs typeface="Times New Roman" panose="02020603050405020304" pitchFamily="18" charset="0"/>
@@ -6649,7 +6568,7 @@
             <a:lstStyle/>
             <a:p>
               <a:r>
-                <a:rPr lang="en-US" sz="1100" dirty="0" smtClean="0">
+                <a:rPr lang="en-US" sz="1100" dirty="0">
                   <a:latin typeface="Calibri" panose="020F0502020204030204" pitchFamily="34" charset="0"/>
                   <a:ea typeface="Calibri" panose="020F0502020204030204" pitchFamily="34" charset="0"/>
                   <a:cs typeface="Times New Roman" panose="02020603050405020304" pitchFamily="18" charset="0"/>
@@ -6682,7 +6601,7 @@
             <a:lstStyle/>
             <a:p>
               <a:r>
-                <a:rPr lang="en-US" sz="1100" dirty="0" smtClean="0">
+                <a:rPr lang="en-US" sz="1100" dirty="0">
                   <a:latin typeface="Calibri" panose="020F0502020204030204" pitchFamily="34" charset="0"/>
                   <a:ea typeface="Calibri" panose="020F0502020204030204" pitchFamily="34" charset="0"/>
                   <a:cs typeface="Times New Roman" panose="02020603050405020304" pitchFamily="18" charset="0"/>
@@ -6715,7 +6634,7 @@
             <a:lstStyle/>
             <a:p>
               <a:r>
-                <a:rPr lang="en-US" sz="1100" dirty="0" smtClean="0">
+                <a:rPr lang="en-US" sz="1100" dirty="0">
                   <a:latin typeface="Calibri" panose="020F0502020204030204" pitchFamily="34" charset="0"/>
                   <a:ea typeface="Calibri" panose="020F0502020204030204" pitchFamily="34" charset="0"/>
                   <a:cs typeface="Times New Roman" panose="02020603050405020304" pitchFamily="18" charset="0"/>
@@ -6809,13 +6728,675 @@
   <p:clrMapOvr>
     <a:masterClrMapping/>
   </p:clrMapOvr>
-  <p:timing>
-    <p:tnLst>
-      <p:par>
-        <p:cTn id="1" dur="indefinite" restart="never" nodeType="tmRoot"/>
-      </p:par>
-    </p:tnLst>
-  </p:timing>
+</p:sld>
+</file>
+
+<file path=ppt/slides/slide4.xml><?xml version="1.0" encoding="utf-8"?>
+<p:sld xmlns:a="http://schemas.openxmlformats.org/drawingml/2006/main" xmlns:r="http://schemas.openxmlformats.org/officeDocument/2006/relationships" xmlns:p="http://schemas.openxmlformats.org/presentationml/2006/main">
+  <p:cSld>
+    <p:spTree>
+      <p:nvGrpSpPr>
+        <p:cNvPr id="1" name=""/>
+        <p:cNvGrpSpPr/>
+        <p:nvPr/>
+      </p:nvGrpSpPr>
+      <p:grpSpPr>
+        <a:xfrm>
+          <a:off x="0" y="0"/>
+          <a:ext cx="0" cy="0"/>
+          <a:chOff x="0" y="0"/>
+          <a:chExt cx="0" cy="0"/>
+        </a:xfrm>
+      </p:grpSpPr>
+      <p:grpSp>
+        <p:nvGrpSpPr>
+          <p:cNvPr id="36" name="Group 35">
+            <a:extLst>
+              <a:ext uri="{FF2B5EF4-FFF2-40B4-BE49-F238E27FC236}">
+                <a16:creationId xmlns:a16="http://schemas.microsoft.com/office/drawing/2014/main" id="{4CEEFD0F-F9A2-D649-AB54-EEE2D1D4B780}"/>
+              </a:ext>
+            </a:extLst>
+          </p:cNvPr>
+          <p:cNvGrpSpPr/>
+          <p:nvPr/>
+        </p:nvGrpSpPr>
+        <p:grpSpPr>
+          <a:xfrm>
+            <a:off x="2107650" y="1493134"/>
+            <a:ext cx="7950750" cy="2120532"/>
+            <a:chOff x="2107650" y="1493134"/>
+            <a:chExt cx="7950750" cy="2120532"/>
+          </a:xfrm>
+        </p:grpSpPr>
+        <p:sp>
+          <p:nvSpPr>
+            <p:cNvPr id="4" name="TextBox 3">
+              <a:extLst>
+                <a:ext uri="{FF2B5EF4-FFF2-40B4-BE49-F238E27FC236}">
+                  <a16:creationId xmlns:a16="http://schemas.microsoft.com/office/drawing/2014/main" id="{C52C2D73-DF32-3048-8B39-61518B1974E7}"/>
+                </a:ext>
+              </a:extLst>
+            </p:cNvPr>
+            <p:cNvSpPr txBox="1"/>
+            <p:nvPr/>
+          </p:nvSpPr>
+          <p:spPr>
+            <a:xfrm>
+              <a:off x="2476982" y="1493134"/>
+              <a:ext cx="1600343" cy="369332"/>
+            </a:xfrm>
+            <a:prstGeom prst="rect">
+              <a:avLst/>
+            </a:prstGeom>
+            <a:noFill/>
+          </p:spPr>
+          <p:txBody>
+            <a:bodyPr wrap="square" rtlCol="0">
+              <a:spAutoFit/>
+            </a:bodyPr>
+            <a:lstStyle/>
+            <a:p>
+              <a:r>
+                <a:rPr lang="en-US" b="1" noProof="1"/>
+                <a:t>AppVeyor.com</a:t>
+              </a:r>
+            </a:p>
+          </p:txBody>
+        </p:sp>
+        <p:pic>
+          <p:nvPicPr>
+            <p:cNvPr id="7" name="Graphic 6">
+              <a:extLst>
+                <a:ext uri="{FF2B5EF4-FFF2-40B4-BE49-F238E27FC236}">
+                  <a16:creationId xmlns:a16="http://schemas.microsoft.com/office/drawing/2014/main" id="{F98A1B74-4431-BC4D-9F35-A6CD0AAB8315}"/>
+                </a:ext>
+              </a:extLst>
+            </p:cNvPr>
+            <p:cNvPicPr>
+              <a:picLocks noChangeAspect="1"/>
+            </p:cNvPicPr>
+            <p:nvPr/>
+          </p:nvPicPr>
+          <p:blipFill>
+            <a:blip r:embed="rId2">
+              <a:extLst>
+                <a:ext uri="{28A0092B-C50C-407E-A947-70E740481C1C}">
+                  <a14:useLocalDpi xmlns:a14="http://schemas.microsoft.com/office/drawing/2010/main" val="0"/>
+                </a:ext>
+                <a:ext uri="{96DAC541-7B7A-43D3-8B79-37D633B846F1}">
+                  <asvg:svgBlip xmlns:asvg="http://schemas.microsoft.com/office/drawing/2016/SVG/main" r:embed="rId3"/>
+                </a:ext>
+              </a:extLst>
+            </a:blip>
+            <a:stretch>
+              <a:fillRect/>
+            </a:stretch>
+          </p:blipFill>
+          <p:spPr>
+            <a:xfrm flipH="1">
+              <a:off x="2107650" y="1493134"/>
+              <a:ext cx="369332" cy="369332"/>
+            </a:xfrm>
+            <a:prstGeom prst="rect">
+              <a:avLst/>
+            </a:prstGeom>
+          </p:spPr>
+        </p:pic>
+        <p:pic>
+          <p:nvPicPr>
+            <p:cNvPr id="9" name="Picture 8">
+              <a:extLst>
+                <a:ext uri="{FF2B5EF4-FFF2-40B4-BE49-F238E27FC236}">
+                  <a16:creationId xmlns:a16="http://schemas.microsoft.com/office/drawing/2014/main" id="{AB37DBB3-2FC4-A142-AD14-09CDC2E4D536}"/>
+                </a:ext>
+              </a:extLst>
+            </p:cNvPr>
+            <p:cNvPicPr>
+              <a:picLocks noChangeAspect="1"/>
+            </p:cNvPicPr>
+            <p:nvPr/>
+          </p:nvPicPr>
+          <p:blipFill>
+            <a:blip r:embed="rId4">
+              <a:extLst>
+                <a:ext uri="{28A0092B-C50C-407E-A947-70E740481C1C}">
+                  <a14:useLocalDpi xmlns:a14="http://schemas.microsoft.com/office/drawing/2010/main" val="0"/>
+                </a:ext>
+              </a:extLst>
+            </a:blip>
+            <a:stretch>
+              <a:fillRect/>
+            </a:stretch>
+          </p:blipFill>
+          <p:spPr>
+            <a:xfrm>
+              <a:off x="6476176" y="1502242"/>
+              <a:ext cx="369332" cy="369332"/>
+            </a:xfrm>
+            <a:prstGeom prst="rect">
+              <a:avLst/>
+            </a:prstGeom>
+          </p:spPr>
+        </p:pic>
+        <p:sp>
+          <p:nvSpPr>
+            <p:cNvPr id="10" name="TextBox 9">
+              <a:extLst>
+                <a:ext uri="{FF2B5EF4-FFF2-40B4-BE49-F238E27FC236}">
+                  <a16:creationId xmlns:a16="http://schemas.microsoft.com/office/drawing/2014/main" id="{B0AAA7B6-79EB-5541-A9B2-70E16DAC222C}"/>
+                </a:ext>
+              </a:extLst>
+            </p:cNvPr>
+            <p:cNvSpPr txBox="1"/>
+            <p:nvPr/>
+          </p:nvSpPr>
+          <p:spPr>
+            <a:xfrm>
+              <a:off x="6845508" y="1502242"/>
+              <a:ext cx="1600343" cy="369332"/>
+            </a:xfrm>
+            <a:prstGeom prst="rect">
+              <a:avLst/>
+            </a:prstGeom>
+            <a:noFill/>
+          </p:spPr>
+          <p:txBody>
+            <a:bodyPr wrap="square" rtlCol="0">
+              <a:spAutoFit/>
+            </a:bodyPr>
+            <a:lstStyle/>
+            <a:p>
+              <a:r>
+                <a:rPr lang="en-US" b="1" noProof="1"/>
+                <a:t>SignPath.io</a:t>
+              </a:r>
+            </a:p>
+          </p:txBody>
+        </p:sp>
+        <p:sp>
+          <p:nvSpPr>
+            <p:cNvPr id="11" name="TextBox 10">
+              <a:extLst>
+                <a:ext uri="{FF2B5EF4-FFF2-40B4-BE49-F238E27FC236}">
+                  <a16:creationId xmlns:a16="http://schemas.microsoft.com/office/drawing/2014/main" id="{85CF9691-2364-394D-A706-B54FB6132C32}"/>
+                </a:ext>
+              </a:extLst>
+            </p:cNvPr>
+            <p:cNvSpPr txBox="1"/>
+            <p:nvPr/>
+          </p:nvSpPr>
+          <p:spPr>
+            <a:xfrm>
+              <a:off x="2476982" y="1871574"/>
+              <a:ext cx="2056151" cy="369332"/>
+            </a:xfrm>
+            <a:prstGeom prst="rect">
+              <a:avLst/>
+            </a:prstGeom>
+            <a:noFill/>
+          </p:spPr>
+          <p:txBody>
+            <a:bodyPr wrap="square" rtlCol="0">
+              <a:spAutoFit/>
+            </a:bodyPr>
+            <a:lstStyle/>
+            <a:p>
+              <a:r>
+                <a:rPr lang="en-US" noProof="1"/>
+                <a:t>Profile </a:t>
+              </a:r>
+              <a:r>
+                <a:rPr lang="en-US" noProof="1">
+                  <a:sym typeface="Wingdings" pitchFamily="2" charset="2"/>
+                </a:rPr>
+                <a:t> API Keys</a:t>
+              </a:r>
+              <a:endParaRPr lang="en-US" noProof="1"/>
+            </a:p>
+          </p:txBody>
+        </p:sp>
+        <p:sp>
+          <p:nvSpPr>
+            <p:cNvPr id="12" name="TextBox 11">
+              <a:extLst>
+                <a:ext uri="{FF2B5EF4-FFF2-40B4-BE49-F238E27FC236}">
+                  <a16:creationId xmlns:a16="http://schemas.microsoft.com/office/drawing/2014/main" id="{E51283C9-4D96-3840-A35D-9BBCFED0BD41}"/>
+                </a:ext>
+              </a:extLst>
+            </p:cNvPr>
+            <p:cNvSpPr txBox="1"/>
+            <p:nvPr/>
+          </p:nvSpPr>
+          <p:spPr>
+            <a:xfrm>
+              <a:off x="6845508" y="1871574"/>
+              <a:ext cx="3212892" cy="369332"/>
+            </a:xfrm>
+            <a:prstGeom prst="rect">
+              <a:avLst/>
+            </a:prstGeom>
+            <a:noFill/>
+          </p:spPr>
+          <p:txBody>
+            <a:bodyPr wrap="square" rtlCol="0">
+              <a:spAutoFit/>
+            </a:bodyPr>
+            <a:lstStyle/>
+            <a:p>
+              <a:r>
+                <a:rPr lang="en-US" noProof="1"/>
+                <a:t>Project </a:t>
+              </a:r>
+              <a:r>
+                <a:rPr lang="en-US" noProof="1">
+                  <a:sym typeface="Wingdings" pitchFamily="2" charset="2"/>
+                </a:rPr>
+                <a:t> AppVeyor Integration</a:t>
+              </a:r>
+              <a:endParaRPr lang="en-US" noProof="1"/>
+            </a:p>
+          </p:txBody>
+        </p:sp>
+        <p:cxnSp>
+          <p:nvCxnSpPr>
+            <p:cNvPr id="14" name="Straight Arrow Connector 13">
+              <a:extLst>
+                <a:ext uri="{FF2B5EF4-FFF2-40B4-BE49-F238E27FC236}">
+                  <a16:creationId xmlns:a16="http://schemas.microsoft.com/office/drawing/2014/main" id="{9E1A16FD-4528-6941-9A41-6580AB2B6019}"/>
+                </a:ext>
+              </a:extLst>
+            </p:cNvPr>
+            <p:cNvCxnSpPr>
+              <a:stCxn id="11" idx="3"/>
+            </p:cNvCxnSpPr>
+            <p:nvPr/>
+          </p:nvCxnSpPr>
+          <p:spPr>
+            <a:xfrm>
+              <a:off x="4533133" y="2056240"/>
+              <a:ext cx="2092519" cy="12403"/>
+            </a:xfrm>
+            <a:prstGeom prst="straightConnector1">
+              <a:avLst/>
+            </a:prstGeom>
+            <a:ln>
+              <a:solidFill>
+                <a:srgbClr val="02B1E6"/>
+              </a:solidFill>
+              <a:tailEnd type="triangle" w="lg" len="lg"/>
+            </a:ln>
+          </p:spPr>
+          <p:style>
+            <a:lnRef idx="1">
+              <a:schemeClr val="accent1"/>
+            </a:lnRef>
+            <a:fillRef idx="0">
+              <a:schemeClr val="accent1"/>
+            </a:fillRef>
+            <a:effectRef idx="0">
+              <a:schemeClr val="accent1"/>
+            </a:effectRef>
+            <a:fontRef idx="minor">
+              <a:schemeClr val="tx1"/>
+            </a:fontRef>
+          </p:style>
+        </p:cxnSp>
+        <p:sp>
+          <p:nvSpPr>
+            <p:cNvPr id="15" name="TextBox 14">
+              <a:extLst>
+                <a:ext uri="{FF2B5EF4-FFF2-40B4-BE49-F238E27FC236}">
+                  <a16:creationId xmlns:a16="http://schemas.microsoft.com/office/drawing/2014/main" id="{DC15F2AC-E812-2E45-873F-2489C9F940DF}"/>
+                </a:ext>
+              </a:extLst>
+            </p:cNvPr>
+            <p:cNvSpPr txBox="1"/>
+            <p:nvPr/>
+          </p:nvSpPr>
+          <p:spPr>
+            <a:xfrm>
+              <a:off x="4533133" y="1686908"/>
+              <a:ext cx="2312375" cy="369332"/>
+            </a:xfrm>
+            <a:prstGeom prst="rect">
+              <a:avLst/>
+            </a:prstGeom>
+            <a:noFill/>
+          </p:spPr>
+          <p:txBody>
+            <a:bodyPr wrap="square" rtlCol="0">
+              <a:spAutoFit/>
+            </a:bodyPr>
+            <a:lstStyle/>
+            <a:p>
+              <a:r>
+                <a:rPr lang="en-US" b="1" noProof="1">
+                  <a:solidFill>
+                    <a:srgbClr val="02B1E6"/>
+                  </a:solidFill>
+                </a:rPr>
+                <a:t>1.   </a:t>
+              </a:r>
+              <a:r>
+                <a:rPr lang="en-US" noProof="1">
+                  <a:solidFill>
+                    <a:srgbClr val="02B1E6"/>
+                  </a:solidFill>
+                </a:rPr>
+                <a:t>Bearer token</a:t>
+              </a:r>
+            </a:p>
+          </p:txBody>
+        </p:sp>
+        <p:sp>
+          <p:nvSpPr>
+            <p:cNvPr id="16" name="TextBox 15">
+              <a:extLst>
+                <a:ext uri="{FF2B5EF4-FFF2-40B4-BE49-F238E27FC236}">
+                  <a16:creationId xmlns:a16="http://schemas.microsoft.com/office/drawing/2014/main" id="{266D5777-D3FC-D34E-8D31-14847310BF16}"/>
+                </a:ext>
+              </a:extLst>
+            </p:cNvPr>
+            <p:cNvSpPr txBox="1"/>
+            <p:nvPr/>
+          </p:nvSpPr>
+          <p:spPr>
+            <a:xfrm>
+              <a:off x="6845508" y="2253309"/>
+              <a:ext cx="3212892" cy="369332"/>
+            </a:xfrm>
+            <a:prstGeom prst="rect">
+              <a:avLst/>
+            </a:prstGeom>
+            <a:noFill/>
+          </p:spPr>
+          <p:txBody>
+            <a:bodyPr wrap="square" rtlCol="0">
+              <a:spAutoFit/>
+            </a:bodyPr>
+            <a:lstStyle/>
+            <a:p>
+              <a:r>
+                <a:rPr lang="en-US" noProof="1"/>
+                <a:t>CI User</a:t>
+              </a:r>
+            </a:p>
+          </p:txBody>
+        </p:sp>
+        <p:sp>
+          <p:nvSpPr>
+            <p:cNvPr id="17" name="TextBox 16">
+              <a:extLst>
+                <a:ext uri="{FF2B5EF4-FFF2-40B4-BE49-F238E27FC236}">
+                  <a16:creationId xmlns:a16="http://schemas.microsoft.com/office/drawing/2014/main" id="{D3DE9AB6-0D1E-854A-9387-1F7A6890D833}"/>
+                </a:ext>
+              </a:extLst>
+            </p:cNvPr>
+            <p:cNvSpPr txBox="1"/>
+            <p:nvPr/>
+          </p:nvSpPr>
+          <p:spPr>
+            <a:xfrm>
+              <a:off x="2476981" y="2253309"/>
+              <a:ext cx="2574704" cy="369332"/>
+            </a:xfrm>
+            <a:prstGeom prst="rect">
+              <a:avLst/>
+            </a:prstGeom>
+            <a:noFill/>
+          </p:spPr>
+          <p:txBody>
+            <a:bodyPr wrap="square" rtlCol="0">
+              <a:spAutoFit/>
+            </a:bodyPr>
+            <a:lstStyle/>
+            <a:p>
+              <a:r>
+                <a:rPr lang="en-US" noProof="1"/>
+                <a:t>Settings </a:t>
+              </a:r>
+              <a:r>
+                <a:rPr lang="en-US" noProof="1">
+                  <a:sym typeface="Wingdings" pitchFamily="2" charset="2"/>
+                </a:rPr>
+                <a:t> Encrypt YAML</a:t>
+              </a:r>
+              <a:endParaRPr lang="en-US" noProof="1"/>
+            </a:p>
+          </p:txBody>
+        </p:sp>
+        <p:cxnSp>
+          <p:nvCxnSpPr>
+            <p:cNvPr id="18" name="Straight Arrow Connector 17">
+              <a:extLst>
+                <a:ext uri="{FF2B5EF4-FFF2-40B4-BE49-F238E27FC236}">
+                  <a16:creationId xmlns:a16="http://schemas.microsoft.com/office/drawing/2014/main" id="{5A2172C8-536B-9B40-8CE0-622CC83E0230}"/>
+                </a:ext>
+              </a:extLst>
+            </p:cNvPr>
+            <p:cNvCxnSpPr>
+              <a:cxnSpLocks/>
+              <a:endCxn id="17" idx="3"/>
+            </p:cNvCxnSpPr>
+            <p:nvPr/>
+          </p:nvCxnSpPr>
+          <p:spPr>
+            <a:xfrm flipH="1">
+              <a:off x="5051685" y="2437975"/>
+              <a:ext cx="1424491" cy="0"/>
+            </a:xfrm>
+            <a:prstGeom prst="straightConnector1">
+              <a:avLst/>
+            </a:prstGeom>
+            <a:ln>
+              <a:solidFill>
+                <a:srgbClr val="02B1E6"/>
+              </a:solidFill>
+              <a:tailEnd type="triangle" w="lg" len="lg"/>
+            </a:ln>
+          </p:spPr>
+          <p:style>
+            <a:lnRef idx="1">
+              <a:schemeClr val="accent1"/>
+            </a:lnRef>
+            <a:fillRef idx="0">
+              <a:schemeClr val="accent1"/>
+            </a:fillRef>
+            <a:effectRef idx="0">
+              <a:schemeClr val="accent1"/>
+            </a:effectRef>
+            <a:fontRef idx="minor">
+              <a:schemeClr val="tx1"/>
+            </a:fontRef>
+          </p:style>
+        </p:cxnSp>
+        <p:sp>
+          <p:nvSpPr>
+            <p:cNvPr id="22" name="TextBox 21">
+              <a:extLst>
+                <a:ext uri="{FF2B5EF4-FFF2-40B4-BE49-F238E27FC236}">
+                  <a16:creationId xmlns:a16="http://schemas.microsoft.com/office/drawing/2014/main" id="{CCAEBA0B-7759-084A-8A2F-1A244FEB295A}"/>
+                </a:ext>
+              </a:extLst>
+            </p:cNvPr>
+            <p:cNvSpPr txBox="1"/>
+            <p:nvPr/>
+          </p:nvSpPr>
+          <p:spPr>
+            <a:xfrm>
+              <a:off x="2711626" y="2738939"/>
+              <a:ext cx="2574697" cy="369332"/>
+            </a:xfrm>
+            <a:prstGeom prst="rect">
+              <a:avLst/>
+            </a:prstGeom>
+            <a:noFill/>
+          </p:spPr>
+          <p:txBody>
+            <a:bodyPr wrap="square" rtlCol="0">
+              <a:spAutoFit/>
+            </a:bodyPr>
+            <a:lstStyle/>
+            <a:p>
+              <a:r>
+                <a:rPr lang="en-US" b="1" noProof="1">
+                  <a:solidFill>
+                    <a:srgbClr val="02B1E6"/>
+                  </a:solidFill>
+                </a:rPr>
+                <a:t>3.   </a:t>
+              </a:r>
+              <a:r>
+                <a:rPr lang="en-US" noProof="1">
+                  <a:solidFill>
+                    <a:srgbClr val="02B1E6"/>
+                  </a:solidFill>
+                </a:rPr>
+                <a:t>Encrypted API token</a:t>
+              </a:r>
+            </a:p>
+          </p:txBody>
+        </p:sp>
+        <p:sp>
+          <p:nvSpPr>
+            <p:cNvPr id="23" name="TextBox 22">
+              <a:extLst>
+                <a:ext uri="{FF2B5EF4-FFF2-40B4-BE49-F238E27FC236}">
+                  <a16:creationId xmlns:a16="http://schemas.microsoft.com/office/drawing/2014/main" id="{989E5952-7766-8A43-B440-BE4B0B45CC90}"/>
+                </a:ext>
+              </a:extLst>
+            </p:cNvPr>
+            <p:cNvSpPr txBox="1"/>
+            <p:nvPr/>
+          </p:nvSpPr>
+          <p:spPr>
+            <a:xfrm>
+              <a:off x="2476981" y="3244334"/>
+              <a:ext cx="1825192" cy="369332"/>
+            </a:xfrm>
+            <a:prstGeom prst="rect">
+              <a:avLst/>
+            </a:prstGeom>
+            <a:noFill/>
+          </p:spPr>
+          <p:txBody>
+            <a:bodyPr wrap="square" rtlCol="0">
+              <a:spAutoFit/>
+            </a:bodyPr>
+            <a:lstStyle/>
+            <a:p>
+              <a:r>
+                <a:rPr lang="en-US" noProof="1">
+                  <a:latin typeface="Courier New" panose="02070309020205020404" pitchFamily="49" charset="0"/>
+                  <a:cs typeface="Courier New" panose="02070309020205020404" pitchFamily="49" charset="0"/>
+                </a:rPr>
+                <a:t>appveyor.yml</a:t>
+              </a:r>
+            </a:p>
+          </p:txBody>
+        </p:sp>
+        <p:cxnSp>
+          <p:nvCxnSpPr>
+            <p:cNvPr id="24" name="Straight Arrow Connector 23">
+              <a:extLst>
+                <a:ext uri="{FF2B5EF4-FFF2-40B4-BE49-F238E27FC236}">
+                  <a16:creationId xmlns:a16="http://schemas.microsoft.com/office/drawing/2014/main" id="{B2AABAF8-7219-8044-80C9-982350FEB862}"/>
+                </a:ext>
+              </a:extLst>
+            </p:cNvPr>
+            <p:cNvCxnSpPr>
+              <a:cxnSpLocks/>
+            </p:cNvCxnSpPr>
+            <p:nvPr/>
+          </p:nvCxnSpPr>
+          <p:spPr>
+            <a:xfrm>
+              <a:off x="3057993" y="2651593"/>
+              <a:ext cx="0" cy="592741"/>
+            </a:xfrm>
+            <a:prstGeom prst="straightConnector1">
+              <a:avLst/>
+            </a:prstGeom>
+            <a:ln>
+              <a:solidFill>
+                <a:srgbClr val="02B1E6"/>
+              </a:solidFill>
+              <a:tailEnd type="triangle" w="lg" len="lg"/>
+            </a:ln>
+          </p:spPr>
+          <p:style>
+            <a:lnRef idx="1">
+              <a:schemeClr val="accent1"/>
+            </a:lnRef>
+            <a:fillRef idx="0">
+              <a:schemeClr val="accent1"/>
+            </a:fillRef>
+            <a:effectRef idx="0">
+              <a:schemeClr val="accent1"/>
+            </a:effectRef>
+            <a:fontRef idx="minor">
+              <a:schemeClr val="tx1"/>
+            </a:fontRef>
+          </p:style>
+        </p:cxnSp>
+        <p:sp>
+          <p:nvSpPr>
+            <p:cNvPr id="30" name="TextBox 29">
+              <a:extLst>
+                <a:ext uri="{FF2B5EF4-FFF2-40B4-BE49-F238E27FC236}">
+                  <a16:creationId xmlns:a16="http://schemas.microsoft.com/office/drawing/2014/main" id="{23FB40B7-0924-024D-A6E5-AB8989DDF47F}"/>
+                </a:ext>
+              </a:extLst>
+            </p:cNvPr>
+            <p:cNvSpPr txBox="1"/>
+            <p:nvPr/>
+          </p:nvSpPr>
+          <p:spPr>
+            <a:xfrm>
+              <a:off x="5127329" y="2466927"/>
+              <a:ext cx="2077040" cy="369332"/>
+            </a:xfrm>
+            <a:prstGeom prst="rect">
+              <a:avLst/>
+            </a:prstGeom>
+            <a:noFill/>
+          </p:spPr>
+          <p:txBody>
+            <a:bodyPr wrap="square" rtlCol="0">
+              <a:spAutoFit/>
+            </a:bodyPr>
+            <a:lstStyle/>
+            <a:p>
+              <a:r>
+                <a:rPr lang="en-US" b="1" noProof="1">
+                  <a:solidFill>
+                    <a:srgbClr val="02B1E6"/>
+                  </a:solidFill>
+                </a:rPr>
+                <a:t>2</a:t>
+              </a:r>
+              <a:r>
+                <a:rPr lang="en-US" noProof="1">
+                  <a:solidFill>
+                    <a:srgbClr val="02B1E6"/>
+                  </a:solidFill>
+                </a:rPr>
+                <a:t>.  API token</a:t>
+              </a:r>
+            </a:p>
+          </p:txBody>
+        </p:sp>
+      </p:grpSp>
+    </p:spTree>
+    <p:extLst>
+      <p:ext uri="{BB962C8B-B14F-4D97-AF65-F5344CB8AC3E}">
+        <p14:creationId xmlns:p14="http://schemas.microsoft.com/office/powerpoint/2010/main" val="3475253488"/>
+      </p:ext>
+    </p:extLst>
+  </p:cSld>
+  <p:clrMapOvr>
+    <a:masterClrMapping/>
+  </p:clrMapOvr>
 </p:sld>
 </file>
 

</xml_diff>